<commit_message>
Updated the pptx-file with more details on structure.
</commit_message>
<xml_diff>
--- a/ASP.NET5.pptx
+++ b/ASP.NET5.pptx
@@ -310,7 +310,7 @@
           <a:p>
             <a:fld id="{4B41A3B5-7BB9-4491-8175-EC26F4016976}" type="datetimeFigureOut">
               <a:rPr lang="nb-NO" smtClean="0"/>
-              <a:t>08.02.2016</a:t>
+              <a:t>10.02.2016</a:t>
             </a:fld>
             <a:endParaRPr lang="nb-NO"/>
           </a:p>
@@ -746,7 +746,7 @@
           <a:p>
             <a:fld id="{4B41A3B5-7BB9-4491-8175-EC26F4016976}" type="datetimeFigureOut">
               <a:rPr lang="nb-NO" smtClean="0"/>
-              <a:t>08.02.2016</a:t>
+              <a:t>10.02.2016</a:t>
             </a:fld>
             <a:endParaRPr lang="nb-NO"/>
           </a:p>
@@ -996,7 +996,7 @@
           <a:p>
             <a:fld id="{4B41A3B5-7BB9-4491-8175-EC26F4016976}" type="datetimeFigureOut">
               <a:rPr lang="nb-NO" smtClean="0"/>
-              <a:t>08.02.2016</a:t>
+              <a:t>10.02.2016</a:t>
             </a:fld>
             <a:endParaRPr lang="nb-NO"/>
           </a:p>
@@ -1304,7 +1304,7 @@
           <a:p>
             <a:fld id="{4B41A3B5-7BB9-4491-8175-EC26F4016976}" type="datetimeFigureOut">
               <a:rPr lang="nb-NO" smtClean="0"/>
-              <a:t>08.02.2016</a:t>
+              <a:t>10.02.2016</a:t>
             </a:fld>
             <a:endParaRPr lang="nb-NO"/>
           </a:p>
@@ -1622,7 +1622,7 @@
           <a:p>
             <a:fld id="{4B41A3B5-7BB9-4491-8175-EC26F4016976}" type="datetimeFigureOut">
               <a:rPr lang="nb-NO" smtClean="0"/>
-              <a:t>08.02.2016</a:t>
+              <a:t>10.02.2016</a:t>
             </a:fld>
             <a:endParaRPr lang="nb-NO"/>
           </a:p>
@@ -1924,7 +1924,7 @@
           <a:p>
             <a:fld id="{4B41A3B5-7BB9-4491-8175-EC26F4016976}" type="datetimeFigureOut">
               <a:rPr lang="nb-NO" smtClean="0"/>
-              <a:t>08.02.2016</a:t>
+              <a:t>10.02.2016</a:t>
             </a:fld>
             <a:endParaRPr lang="nb-NO"/>
           </a:p>
@@ -2291,7 +2291,7 @@
           <a:p>
             <a:fld id="{4B41A3B5-7BB9-4491-8175-EC26F4016976}" type="datetimeFigureOut">
               <a:rPr lang="nb-NO" smtClean="0"/>
-              <a:t>08.02.2016</a:t>
+              <a:t>10.02.2016</a:t>
             </a:fld>
             <a:endParaRPr lang="nb-NO"/>
           </a:p>
@@ -2465,7 +2465,7 @@
           <a:p>
             <a:fld id="{4B41A3B5-7BB9-4491-8175-EC26F4016976}" type="datetimeFigureOut">
               <a:rPr lang="nb-NO" smtClean="0"/>
-              <a:t>08.02.2016</a:t>
+              <a:t>10.02.2016</a:t>
             </a:fld>
             <a:endParaRPr lang="nb-NO"/>
           </a:p>
@@ -2645,7 +2645,7 @@
           <a:p>
             <a:fld id="{4B41A3B5-7BB9-4491-8175-EC26F4016976}" type="datetimeFigureOut">
               <a:rPr lang="nb-NO" smtClean="0"/>
-              <a:t>08.02.2016</a:t>
+              <a:t>10.02.2016</a:t>
             </a:fld>
             <a:endParaRPr lang="nb-NO"/>
           </a:p>
@@ -2815,7 +2815,7 @@
           <a:p>
             <a:fld id="{4B41A3B5-7BB9-4491-8175-EC26F4016976}" type="datetimeFigureOut">
               <a:rPr lang="nb-NO" smtClean="0"/>
-              <a:t>08.02.2016</a:t>
+              <a:t>10.02.2016</a:t>
             </a:fld>
             <a:endParaRPr lang="nb-NO"/>
           </a:p>
@@ -3065,7 +3065,7 @@
           <a:p>
             <a:fld id="{4B41A3B5-7BB9-4491-8175-EC26F4016976}" type="datetimeFigureOut">
               <a:rPr lang="nb-NO" smtClean="0"/>
-              <a:t>08.02.2016</a:t>
+              <a:t>10.02.2016</a:t>
             </a:fld>
             <a:endParaRPr lang="nb-NO"/>
           </a:p>
@@ -3301,7 +3301,7 @@
           <a:p>
             <a:fld id="{4B41A3B5-7BB9-4491-8175-EC26F4016976}" type="datetimeFigureOut">
               <a:rPr lang="nb-NO" smtClean="0"/>
-              <a:t>08.02.2016</a:t>
+              <a:t>10.02.2016</a:t>
             </a:fld>
             <a:endParaRPr lang="nb-NO"/>
           </a:p>
@@ -3683,7 +3683,7 @@
           <a:p>
             <a:fld id="{4B41A3B5-7BB9-4491-8175-EC26F4016976}" type="datetimeFigureOut">
               <a:rPr lang="nb-NO" smtClean="0"/>
-              <a:t>08.02.2016</a:t>
+              <a:t>10.02.2016</a:t>
             </a:fld>
             <a:endParaRPr lang="nb-NO"/>
           </a:p>
@@ -3801,7 +3801,7 @@
           <a:p>
             <a:fld id="{4B41A3B5-7BB9-4491-8175-EC26F4016976}" type="datetimeFigureOut">
               <a:rPr lang="nb-NO" smtClean="0"/>
-              <a:t>08.02.2016</a:t>
+              <a:t>10.02.2016</a:t>
             </a:fld>
             <a:endParaRPr lang="nb-NO"/>
           </a:p>
@@ -3896,7 +3896,7 @@
           <a:p>
             <a:fld id="{4B41A3B5-7BB9-4491-8175-EC26F4016976}" type="datetimeFigureOut">
               <a:rPr lang="nb-NO" smtClean="0"/>
-              <a:t>08.02.2016</a:t>
+              <a:t>10.02.2016</a:t>
             </a:fld>
             <a:endParaRPr lang="nb-NO"/>
           </a:p>
@@ -4151,7 +4151,7 @@
           <a:p>
             <a:fld id="{4B41A3B5-7BB9-4491-8175-EC26F4016976}" type="datetimeFigureOut">
               <a:rPr lang="nb-NO" smtClean="0"/>
-              <a:t>08.02.2016</a:t>
+              <a:t>10.02.2016</a:t>
             </a:fld>
             <a:endParaRPr lang="nb-NO"/>
           </a:p>
@@ -4434,7 +4434,7 @@
           <a:p>
             <a:fld id="{4B41A3B5-7BB9-4491-8175-EC26F4016976}" type="datetimeFigureOut">
               <a:rPr lang="nb-NO" smtClean="0"/>
-              <a:t>08.02.2016</a:t>
+              <a:t>10.02.2016</a:t>
             </a:fld>
             <a:endParaRPr lang="nb-NO"/>
           </a:p>
@@ -4840,7 +4840,7 @@
           <a:p>
             <a:fld id="{4B41A3B5-7BB9-4491-8175-EC26F4016976}" type="datetimeFigureOut">
               <a:rPr lang="nb-NO" smtClean="0"/>
-              <a:t>08.02.2016</a:t>
+              <a:t>10.02.2016</a:t>
             </a:fld>
             <a:endParaRPr lang="nb-NO"/>
           </a:p>
@@ -5520,12 +5520,14 @@
         </p:nvSpPr>
         <p:spPr>
           <a:xfrm>
-            <a:off x="684212" y="2962656"/>
-            <a:ext cx="8535988" cy="3031744"/>
+            <a:off x="684212" y="2520176"/>
+            <a:ext cx="8535988" cy="3474224"/>
           </a:xfrm>
         </p:spPr>
         <p:txBody>
-          <a:bodyPr/>
+          <a:bodyPr>
+            <a:normAutofit fontScale="92500" lnSpcReduction="10000"/>
+          </a:bodyPr>
           <a:lstStyle/>
           <a:p>
             <a:pPr marL="342900" indent="-342900">
@@ -5533,17 +5535,192 @@
               <a:buChar char="•"/>
             </a:pPr>
             <a:r>
-              <a:rPr lang="nb-NO" dirty="0" err="1"/>
-              <a:t>s</a:t>
-            </a:r>
-            <a:r>
-              <a:rPr lang="nb-NO" dirty="0" err="1" smtClean="0"/>
-              <a:t>rc</a:t>
-            </a:r>
-            <a:r>
-              <a:rPr lang="nb-NO" dirty="0" smtClean="0"/>
-              <a:t>, test</a:t>
-            </a:r>
+              <a:rPr lang="nb-NO" dirty="0" err="1" smtClean="0"/>
+              <a:t>Root</a:t>
+            </a:r>
+            <a:r>
+              <a:rPr lang="nb-NO" dirty="0" smtClean="0"/>
+              <a:t> </a:t>
+            </a:r>
+            <a:r>
+              <a:rPr lang="nb-NO" dirty="0" err="1" smtClean="0"/>
+              <a:t>items</a:t>
+            </a:r>
+            <a:r>
+              <a:rPr lang="nb-NO" dirty="0" smtClean="0"/>
+              <a:t>:</a:t>
+            </a:r>
+          </a:p>
+          <a:p>
+            <a:pPr marL="800100" lvl="1" indent="-342900">
+              <a:buFont typeface="Arial" panose="020B0604020202020204" pitchFamily="34" charset="0"/>
+              <a:buChar char="•"/>
+            </a:pPr>
+            <a:r>
+              <a:rPr lang="nb-NO" dirty="0" smtClean="0"/>
+              <a:t>Solution </a:t>
+            </a:r>
+            <a:r>
+              <a:rPr lang="nb-NO" dirty="0" err="1" smtClean="0"/>
+              <a:t>I</a:t>
+            </a:r>
+            <a:r>
+              <a:rPr lang="nb-NO" dirty="0" err="1" smtClean="0"/>
+              <a:t>tems</a:t>
+            </a:r>
+            <a:r>
+              <a:rPr lang="nb-NO" dirty="0" smtClean="0"/>
+              <a:t>: </a:t>
+            </a:r>
+            <a:r>
+              <a:rPr lang="nb-NO" dirty="0" err="1" smtClean="0"/>
+              <a:t>contains</a:t>
+            </a:r>
+            <a:r>
+              <a:rPr lang="nb-NO" dirty="0" smtClean="0"/>
+              <a:t> </a:t>
+            </a:r>
+            <a:r>
+              <a:rPr lang="nb-NO" dirty="0" err="1" smtClean="0"/>
+              <a:t>global.json</a:t>
+            </a:r>
+            <a:r>
+              <a:rPr lang="nb-NO" dirty="0" smtClean="0"/>
+              <a:t> </a:t>
+            </a:r>
+            <a:r>
+              <a:rPr lang="nb-NO" dirty="0" err="1" smtClean="0"/>
+              <a:t>which</a:t>
+            </a:r>
+            <a:r>
+              <a:rPr lang="nb-NO" dirty="0" smtClean="0"/>
+              <a:t> </a:t>
+            </a:r>
+            <a:r>
+              <a:rPr lang="nb-NO" dirty="0" err="1" smtClean="0"/>
+              <a:t>includ</a:t>
+            </a:r>
+            <a:r>
+              <a:rPr lang="nb-NO" dirty="0" err="1" smtClean="0"/>
+              <a:t>e</a:t>
+            </a:r>
+            <a:r>
+              <a:rPr lang="nb-NO" dirty="0" smtClean="0"/>
+              <a:t> folders:</a:t>
+            </a:r>
+            <a:r>
+              <a:rPr lang="nb-NO" dirty="0" smtClean="0"/>
+              <a:t> </a:t>
+            </a:r>
+            <a:r>
+              <a:rPr lang="nb-NO" dirty="0" err="1" smtClean="0"/>
+              <a:t>src</a:t>
+            </a:r>
+            <a:r>
+              <a:rPr lang="nb-NO" dirty="0" smtClean="0"/>
+              <a:t>, </a:t>
+            </a:r>
+            <a:r>
+              <a:rPr lang="nb-NO" dirty="0" smtClean="0"/>
+              <a:t>test by </a:t>
+            </a:r>
+            <a:r>
+              <a:rPr lang="nb-NO" dirty="0" err="1" smtClean="0"/>
+              <a:t>default</a:t>
+            </a:r>
+            <a:r>
+              <a:rPr lang="nb-NO" dirty="0" smtClean="0"/>
+              <a:t>.</a:t>
+            </a:r>
+          </a:p>
+          <a:p>
+            <a:pPr marL="800100" lvl="1" indent="-342900">
+              <a:buFont typeface="Arial" panose="020B0604020202020204" pitchFamily="34" charset="0"/>
+              <a:buChar char="•"/>
+            </a:pPr>
+            <a:r>
+              <a:rPr lang="nb-NO" dirty="0" err="1" smtClean="0"/>
+              <a:t>Src</a:t>
+            </a:r>
+            <a:r>
+              <a:rPr lang="nb-NO" dirty="0" smtClean="0"/>
+              <a:t>: Source </a:t>
+            </a:r>
+            <a:r>
+              <a:rPr lang="nb-NO" dirty="0" err="1" smtClean="0"/>
+              <a:t>code</a:t>
+            </a:r>
+            <a:r>
+              <a:rPr lang="nb-NO" dirty="0" smtClean="0"/>
+              <a:t> </a:t>
+            </a:r>
+            <a:r>
+              <a:rPr lang="nb-NO" dirty="0" err="1" smtClean="0"/>
+              <a:t>should</a:t>
+            </a:r>
+            <a:r>
+              <a:rPr lang="nb-NO" dirty="0" smtClean="0"/>
+              <a:t> be </a:t>
+            </a:r>
+            <a:r>
+              <a:rPr lang="nb-NO" dirty="0" err="1" smtClean="0"/>
+              <a:t>put</a:t>
+            </a:r>
+            <a:r>
+              <a:rPr lang="nb-NO" dirty="0" smtClean="0"/>
+              <a:t> </a:t>
+            </a:r>
+            <a:r>
+              <a:rPr lang="nb-NO" dirty="0" err="1" smtClean="0"/>
+              <a:t>here</a:t>
+            </a:r>
+            <a:r>
+              <a:rPr lang="nb-NO" dirty="0" smtClean="0"/>
+              <a:t>.</a:t>
+            </a:r>
+          </a:p>
+          <a:p>
+            <a:pPr marL="800100" lvl="1" indent="-342900">
+              <a:buFont typeface="Arial" panose="020B0604020202020204" pitchFamily="34" charset="0"/>
+              <a:buChar char="•"/>
+            </a:pPr>
+            <a:r>
+              <a:rPr lang="nb-NO" dirty="0" smtClean="0"/>
+              <a:t>Test: Test </a:t>
+            </a:r>
+            <a:r>
+              <a:rPr lang="nb-NO" dirty="0" err="1" smtClean="0"/>
+              <a:t>project</a:t>
+            </a:r>
+            <a:r>
+              <a:rPr lang="nb-NO" dirty="0" smtClean="0"/>
+              <a:t> </a:t>
+            </a:r>
+            <a:r>
+              <a:rPr lang="nb-NO" dirty="0" err="1" smtClean="0"/>
+              <a:t>should</a:t>
+            </a:r>
+            <a:r>
+              <a:rPr lang="nb-NO" dirty="0" smtClean="0"/>
+              <a:t> be </a:t>
+            </a:r>
+            <a:r>
+              <a:rPr lang="nb-NO" dirty="0" err="1" smtClean="0"/>
+              <a:t>put</a:t>
+            </a:r>
+            <a:r>
+              <a:rPr lang="nb-NO" dirty="0" smtClean="0"/>
+              <a:t> </a:t>
+            </a:r>
+            <a:r>
+              <a:rPr lang="nb-NO" dirty="0" err="1" smtClean="0"/>
+              <a:t>here</a:t>
+            </a:r>
+            <a:r>
+              <a:rPr lang="nb-NO" dirty="0" smtClean="0"/>
+              <a:t>.</a:t>
+            </a:r>
+            <a:endParaRPr lang="nb-NO" dirty="0" smtClean="0"/>
           </a:p>
           <a:p>
             <a:pPr marL="342900" indent="-342900">
@@ -5556,7 +5733,22 @@
             </a:r>
             <a:r>
               <a:rPr lang="nb-NO" dirty="0" smtClean="0"/>
-              <a:t> : serves </a:t>
+              <a:t> </a:t>
+            </a:r>
+            <a:endParaRPr lang="nb-NO" dirty="0"/>
+          </a:p>
+          <a:p>
+            <a:pPr marL="800100" lvl="1" indent="-342900">
+              <a:buFont typeface="Arial" panose="020B0604020202020204" pitchFamily="34" charset="0"/>
+              <a:buChar char="•"/>
+            </a:pPr>
+            <a:r>
+              <a:rPr lang="nb-NO" dirty="0" err="1" smtClean="0"/>
+              <a:t>Any</a:t>
+            </a:r>
+            <a:r>
+              <a:rPr lang="nb-NO" dirty="0" smtClean="0"/>
+              <a:t> </a:t>
             </a:r>
             <a:r>
               <a:rPr lang="nb-NO" dirty="0" err="1" smtClean="0"/>
@@ -5564,21 +5756,179 @@
             </a:r>
             <a:r>
               <a:rPr lang="nb-NO" dirty="0" smtClean="0"/>
-              <a:t> files.</a:t>
-            </a:r>
+              <a:t> files </a:t>
+            </a:r>
+            <a:r>
+              <a:rPr lang="nb-NO" dirty="0" err="1" smtClean="0"/>
+              <a:t>that</a:t>
+            </a:r>
+            <a:r>
+              <a:rPr lang="nb-NO" dirty="0" smtClean="0"/>
+              <a:t> is to be </a:t>
+            </a:r>
+            <a:r>
+              <a:rPr lang="nb-NO" dirty="0" err="1" smtClean="0"/>
+              <a:t>served</a:t>
+            </a:r>
+            <a:r>
+              <a:rPr lang="nb-NO" dirty="0" smtClean="0"/>
+              <a:t> must be </a:t>
+            </a:r>
+            <a:r>
+              <a:rPr lang="nb-NO" dirty="0" err="1" smtClean="0"/>
+              <a:t>inside</a:t>
+            </a:r>
+            <a:r>
+              <a:rPr lang="nb-NO" dirty="0" smtClean="0"/>
+              <a:t> </a:t>
+            </a:r>
+            <a:r>
+              <a:rPr lang="nb-NO" dirty="0" err="1" smtClean="0"/>
+              <a:t>this</a:t>
+            </a:r>
+            <a:r>
+              <a:rPr lang="nb-NO" dirty="0" smtClean="0"/>
+              <a:t> folder. </a:t>
+            </a:r>
+            <a:r>
+              <a:rPr lang="nb-NO" dirty="0" smtClean="0"/>
+              <a:t>(html, .</a:t>
+            </a:r>
+            <a:r>
+              <a:rPr lang="nb-NO" dirty="0" err="1" smtClean="0"/>
+              <a:t>js</a:t>
+            </a:r>
+            <a:r>
+              <a:rPr lang="nb-NO" dirty="0" smtClean="0"/>
+              <a:t>, .</a:t>
+            </a:r>
+            <a:r>
+              <a:rPr lang="nb-NO" dirty="0" err="1" smtClean="0"/>
+              <a:t>icon</a:t>
+            </a:r>
+            <a:r>
+              <a:rPr lang="nb-NO" dirty="0" smtClean="0"/>
+              <a:t>, etc.)</a:t>
+            </a:r>
+            <a:endParaRPr lang="nb-NO" dirty="0" smtClean="0"/>
           </a:p>
           <a:p>
             <a:pPr marL="342900" indent="-342900">
               <a:buFont typeface="Arial" panose="020B0604020202020204" pitchFamily="34" charset="0"/>
               <a:buChar char="•"/>
             </a:pPr>
+            <a:r>
+              <a:rPr lang="nb-NO" dirty="0" smtClean="0"/>
+              <a:t> 	     </a:t>
+            </a:r>
+            <a:r>
+              <a:rPr lang="nb-NO" dirty="0" err="1" smtClean="0"/>
+              <a:t>Dependencies</a:t>
+            </a:r>
+            <a:r>
+              <a:rPr lang="nb-NO" dirty="0" smtClean="0"/>
+              <a:t>:</a:t>
+            </a:r>
+          </a:p>
+          <a:p>
+            <a:pPr marL="800100" lvl="1" indent="-342900">
+              <a:buFont typeface="Arial" panose="020B0604020202020204" pitchFamily="34" charset="0"/>
+              <a:buChar char="•"/>
+            </a:pPr>
+            <a:r>
+              <a:rPr lang="nb-NO" dirty="0" smtClean="0"/>
+              <a:t>Here </a:t>
+            </a:r>
+            <a:r>
+              <a:rPr lang="nb-NO" dirty="0" err="1" smtClean="0"/>
+              <a:t>goes</a:t>
+            </a:r>
+            <a:r>
+              <a:rPr lang="nb-NO" dirty="0" smtClean="0"/>
+              <a:t> </a:t>
+            </a:r>
+            <a:r>
+              <a:rPr lang="nb-NO" dirty="0" err="1" smtClean="0"/>
+              <a:t>every</a:t>
+            </a:r>
+            <a:r>
+              <a:rPr lang="nb-NO" dirty="0" smtClean="0"/>
+              <a:t> </a:t>
+            </a:r>
+            <a:r>
+              <a:rPr lang="nb-NO" dirty="0" err="1" smtClean="0"/>
+              <a:t>client</a:t>
+            </a:r>
+            <a:r>
+              <a:rPr lang="nb-NO" dirty="0" smtClean="0"/>
+              <a:t> side </a:t>
+            </a:r>
+            <a:r>
+              <a:rPr lang="nb-NO" dirty="0" err="1" smtClean="0"/>
+              <a:t>dependensies</a:t>
+            </a:r>
+            <a:r>
+              <a:rPr lang="nb-NO" dirty="0"/>
+              <a:t> </a:t>
+            </a:r>
+            <a:r>
+              <a:rPr lang="nb-NO" dirty="0" smtClean="0"/>
+              <a:t>( </a:t>
+            </a:r>
+            <a:r>
+              <a:rPr lang="nb-NO" dirty="0" err="1" smtClean="0"/>
+              <a:t>jquery</a:t>
+            </a:r>
+            <a:r>
+              <a:rPr lang="nb-NO" dirty="0" smtClean="0"/>
+              <a:t>, </a:t>
+            </a:r>
+            <a:r>
+              <a:rPr lang="nb-NO" dirty="0" err="1" smtClean="0"/>
+              <a:t>angular</a:t>
+            </a:r>
+            <a:r>
+              <a:rPr lang="nb-NO" dirty="0" smtClean="0"/>
+              <a:t>,  etc.)</a:t>
+            </a:r>
             <a:endParaRPr lang="nb-NO" dirty="0" smtClean="0"/>
           </a:p>
-          <a:p>
-            <a:endParaRPr lang="nb-NO" dirty="0"/>
-          </a:p>
-        </p:txBody>
-      </p:sp>
+        </p:txBody>
+      </p:sp>
+      <p:cxnSp>
+        <p:nvCxnSpPr>
+          <p:cNvPr id="5" name="Straight Arrow Connector 4"/>
+          <p:cNvCxnSpPr/>
+          <p:nvPr/>
+        </p:nvCxnSpPr>
+        <p:spPr>
+          <a:xfrm flipV="1">
+            <a:off x="1148575" y="5292567"/>
+            <a:ext cx="245327" cy="200722"/>
+          </a:xfrm>
+          <a:prstGeom prst="straightConnector1">
+            <a:avLst/>
+          </a:prstGeom>
+          <a:ln>
+            <a:headEnd type="none" w="med" len="med"/>
+            <a:tailEnd type="triangle" w="med" len="med"/>
+          </a:ln>
+        </p:spPr>
+        <p:style>
+          <a:lnRef idx="2">
+            <a:schemeClr val="accent1"/>
+          </a:lnRef>
+          <a:fillRef idx="0">
+            <a:schemeClr val="accent1"/>
+          </a:fillRef>
+          <a:effectRef idx="1">
+            <a:schemeClr val="accent1"/>
+          </a:effectRef>
+          <a:fontRef idx="minor">
+            <a:schemeClr val="tx1"/>
+          </a:fontRef>
+        </p:style>
+      </p:cxnSp>
     </p:spTree>
     <p:extLst>
       <p:ext uri="{BB962C8B-B14F-4D97-AF65-F5344CB8AC3E}">
@@ -6529,7 +6879,6 @@
               <a:rPr lang="nb-NO" dirty="0" smtClean="0"/>
               <a:t>:</a:t>
             </a:r>
-            <a:endParaRPr lang="nb-NO" dirty="0" smtClean="0"/>
           </a:p>
           <a:p>
             <a:pPr marL="914400" lvl="1" indent="-457200">
@@ -6699,7 +7048,6 @@
               <a:rPr lang="nb-NO" dirty="0" smtClean="0"/>
               <a:t> net451 and dotnet5.4)</a:t>
             </a:r>
-            <a:endParaRPr lang="nb-NO" dirty="0" smtClean="0"/>
           </a:p>
           <a:p>
             <a:pPr marL="457200" indent="-457200">

</xml_diff>